<commit_message>
add mcp image to pptx
</commit_message>
<xml_diff>
--- a/AI_Agents_in_the_Data_Pipeline.pptx
+++ b/AI_Agents_in_the_Data_Pipeline.pptx
@@ -17,13 +17,14 @@
     <p:sldId id="265" r:id="rId11"/>
     <p:sldId id="276" r:id="rId12"/>
     <p:sldId id="267" r:id="rId13"/>
-    <p:sldId id="271" r:id="rId14"/>
-    <p:sldId id="272" r:id="rId15"/>
-    <p:sldId id="266" r:id="rId16"/>
-    <p:sldId id="277" r:id="rId17"/>
-    <p:sldId id="268" r:id="rId18"/>
-    <p:sldId id="278" r:id="rId19"/>
-    <p:sldId id="270" r:id="rId20"/>
+    <p:sldId id="279" r:id="rId14"/>
+    <p:sldId id="271" r:id="rId15"/>
+    <p:sldId id="272" r:id="rId16"/>
+    <p:sldId id="266" r:id="rId17"/>
+    <p:sldId id="277" r:id="rId18"/>
+    <p:sldId id="268" r:id="rId19"/>
+    <p:sldId id="278" r:id="rId20"/>
+    <p:sldId id="270" r:id="rId21"/>
   </p:sldIdLst>
   <p:sldSz cx="12192000" cy="6858000"/>
   <p:notesSz cx="6858000" cy="9144000"/>
@@ -4127,6 +4128,167 @@
         <p:cNvPr id="1" name="">
           <a:extLst>
             <a:ext uri="{FF2B5EF4-FFF2-40B4-BE49-F238E27FC236}">
+              <a16:creationId xmlns:a16="http://schemas.microsoft.com/office/drawing/2014/main" id="{C76F8CBC-7BA2-7523-FFA8-80E5C3BF6E51}"/>
+            </a:ext>
+          </a:extLst>
+        </p:cNvPr>
+        <p:cNvGrpSpPr/>
+        <p:nvPr/>
+      </p:nvGrpSpPr>
+      <p:grpSpPr>
+        <a:xfrm>
+          <a:off x="0" y="0"/>
+          <a:ext cx="0" cy="0"/>
+          <a:chOff x="0" y="0"/>
+          <a:chExt cx="0" cy="0"/>
+        </a:xfrm>
+      </p:grpSpPr>
+      <p:sp>
+        <p:nvSpPr>
+          <p:cNvPr id="2" name="Title 1">
+            <a:extLst>
+              <a:ext uri="{FF2B5EF4-FFF2-40B4-BE49-F238E27FC236}">
+                <a16:creationId xmlns:a16="http://schemas.microsoft.com/office/drawing/2014/main" id="{5CF4CE1D-7D12-57D7-A5B7-3FE552865DF4}"/>
+              </a:ext>
+            </a:extLst>
+          </p:cNvPr>
+          <p:cNvSpPr>
+            <a:spLocks noGrp="1"/>
+          </p:cNvSpPr>
+          <p:nvPr>
+            <p:ph type="title"/>
+          </p:nvPr>
+        </p:nvSpPr>
+        <p:spPr>
+          <a:xfrm>
+            <a:off x="919314" y="190464"/>
+            <a:ext cx="10515600" cy="1325563"/>
+          </a:xfrm>
+        </p:spPr>
+        <p:txBody>
+          <a:bodyPr/>
+          <a:lstStyle/>
+          <a:p>
+            <a:r>
+              <a:rPr lang="en-GB" dirty="0">
+                <a:solidFill>
+                  <a:srgbClr val="676767"/>
+                </a:solidFill>
+              </a:rPr>
+              <a:t>What is the Model Context Protocol (MCP)?</a:t>
+            </a:r>
+          </a:p>
+        </p:txBody>
+      </p:sp>
+      <p:pic>
+        <p:nvPicPr>
+          <p:cNvPr id="5" name="Content Placeholder 4" descr="A screen shot of a computer&#10;&#10;AI-generated content may be incorrect.">
+            <a:hlinkClick r:id="rId2"/>
+            <a:extLst>
+              <a:ext uri="{FF2B5EF4-FFF2-40B4-BE49-F238E27FC236}">
+                <a16:creationId xmlns:a16="http://schemas.microsoft.com/office/drawing/2014/main" id="{2DE882C9-519D-BBB5-68FE-B5255690F3C7}"/>
+              </a:ext>
+            </a:extLst>
+          </p:cNvPr>
+          <p:cNvPicPr>
+            <a:picLocks noGrp="1" noChangeAspect="1"/>
+          </p:cNvPicPr>
+          <p:nvPr>
+            <p:ph idx="1"/>
+          </p:nvPr>
+        </p:nvPicPr>
+        <p:blipFill>
+          <a:blip r:embed="rId3">
+            <a:extLst>
+              <a:ext uri="{28A0092B-C50C-407E-A947-70E740481C1C}">
+                <a14:useLocalDpi xmlns:a14="http://schemas.microsoft.com/office/drawing/2010/main" val="0"/>
+              </a:ext>
+            </a:extLst>
+          </a:blip>
+          <a:stretch>
+            <a:fillRect/>
+          </a:stretch>
+        </p:blipFill>
+        <p:spPr>
+          <a:xfrm>
+            <a:off x="1387953" y="1250062"/>
+            <a:ext cx="9416091" cy="4575217"/>
+          </a:xfrm>
+          <a:solidFill>
+            <a:srgbClr val="FAF0E6"/>
+          </a:solidFill>
+        </p:spPr>
+      </p:pic>
+      <p:sp>
+        <p:nvSpPr>
+          <p:cNvPr id="6" name="TextBox 5">
+            <a:extLst>
+              <a:ext uri="{FF2B5EF4-FFF2-40B4-BE49-F238E27FC236}">
+                <a16:creationId xmlns:a16="http://schemas.microsoft.com/office/drawing/2014/main" id="{B27020CA-A612-8D52-607E-CEECD3753A24}"/>
+              </a:ext>
+            </a:extLst>
+          </p:cNvPr>
+          <p:cNvSpPr txBox="1"/>
+          <p:nvPr/>
+        </p:nvSpPr>
+        <p:spPr>
+          <a:xfrm>
+            <a:off x="1387952" y="5936143"/>
+            <a:ext cx="9416091" cy="800219"/>
+          </a:xfrm>
+          <a:prstGeom prst="rect">
+            <a:avLst/>
+          </a:prstGeom>
+          <a:noFill/>
+        </p:spPr>
+        <p:txBody>
+          <a:bodyPr wrap="square" rtlCol="0">
+            <a:spAutoFit/>
+          </a:bodyPr>
+          <a:lstStyle/>
+          <a:p>
+            <a:r>
+              <a:rPr lang="en-GB" sz="2800" dirty="0">
+                <a:hlinkClick r:id="rId2"/>
+              </a:rPr>
+              <a:t>https://mcpservers.org/servers/modelcontextprotocol/fetch</a:t>
+            </a:r>
+            <a:endParaRPr lang="en-GB" sz="2800" dirty="0"/>
+          </a:p>
+          <a:p>
+            <a:endParaRPr lang="en-GB" dirty="0"/>
+          </a:p>
+        </p:txBody>
+      </p:sp>
+    </p:spTree>
+    <p:extLst>
+      <p:ext uri="{BB962C8B-B14F-4D97-AF65-F5344CB8AC3E}">
+        <p14:creationId xmlns:p14="http://schemas.microsoft.com/office/powerpoint/2010/main" val="3080813292"/>
+      </p:ext>
+    </p:extLst>
+  </p:cSld>
+  <p:clrMapOvr>
+    <a:masterClrMapping/>
+  </p:clrMapOvr>
+</p:sld>
+</file>
+
+<file path=ppt/slides/slide14.xml><?xml version="1.0" encoding="utf-8"?>
+<p:sld xmlns:a="http://schemas.openxmlformats.org/drawingml/2006/main" xmlns:r="http://schemas.openxmlformats.org/officeDocument/2006/relationships" xmlns:p="http://schemas.openxmlformats.org/presentationml/2006/main">
+  <p:cSld>
+    <p:bg>
+      <p:bgPr>
+        <a:solidFill>
+          <a:srgbClr val="FAF0E6"/>
+        </a:solidFill>
+        <a:effectLst/>
+      </p:bgPr>
+    </p:bg>
+    <p:spTree>
+      <p:nvGrpSpPr>
+        <p:cNvPr id="1" name="">
+          <a:extLst>
+            <a:ext uri="{FF2B5EF4-FFF2-40B4-BE49-F238E27FC236}">
               <a16:creationId xmlns:a16="http://schemas.microsoft.com/office/drawing/2014/main" id="{37A951BD-BBFB-2FFF-6008-EF1837E9CE09}"/>
             </a:ext>
           </a:extLst>
@@ -4269,7 +4431,7 @@
 </p:sld>
 </file>
 
-<file path=ppt/slides/slide14.xml><?xml version="1.0" encoding="utf-8"?>
+<file path=ppt/slides/slide15.xml><?xml version="1.0" encoding="utf-8"?>
 <p:sld xmlns:a="http://schemas.openxmlformats.org/drawingml/2006/main" xmlns:r="http://schemas.openxmlformats.org/officeDocument/2006/relationships" xmlns:p="http://schemas.openxmlformats.org/presentationml/2006/main">
   <p:cSld>
     <p:bg>
@@ -4456,7 +4618,7 @@
 </p:sld>
 </file>
 
-<file path=ppt/slides/slide15.xml><?xml version="1.0" encoding="utf-8"?>
+<file path=ppt/slides/slide16.xml><?xml version="1.0" encoding="utf-8"?>
 <p:sld xmlns:a="http://schemas.openxmlformats.org/drawingml/2006/main" xmlns:r="http://schemas.openxmlformats.org/officeDocument/2006/relationships" xmlns:p="http://schemas.openxmlformats.org/presentationml/2006/main">
   <p:cSld>
     <p:bg>
@@ -4575,7 +4737,7 @@
 </p:sld>
 </file>
 
-<file path=ppt/slides/slide16.xml><?xml version="1.0" encoding="utf-8"?>
+<file path=ppt/slides/slide17.xml><?xml version="1.0" encoding="utf-8"?>
 <p:sld xmlns:a="http://schemas.openxmlformats.org/drawingml/2006/main" xmlns:r="http://schemas.openxmlformats.org/officeDocument/2006/relationships" xmlns:p="http://schemas.openxmlformats.org/presentationml/2006/main">
   <p:cSld>
     <p:bg>
@@ -4733,7 +4895,7 @@
 </p:sld>
 </file>
 
-<file path=ppt/slides/slide17.xml><?xml version="1.0" encoding="utf-8"?>
+<file path=ppt/slides/slide18.xml><?xml version="1.0" encoding="utf-8"?>
 <p:sld xmlns:a="http://schemas.openxmlformats.org/drawingml/2006/main" xmlns:r="http://schemas.openxmlformats.org/officeDocument/2006/relationships" xmlns:p="http://schemas.openxmlformats.org/presentationml/2006/main">
   <p:cSld>
     <p:bg>
@@ -4872,7 +5034,7 @@
 </p:sld>
 </file>
 
-<file path=ppt/slides/slide18.xml><?xml version="1.0" encoding="utf-8"?>
+<file path=ppt/slides/slide19.xml><?xml version="1.0" encoding="utf-8"?>
 <p:sld xmlns:a="http://schemas.openxmlformats.org/drawingml/2006/main" xmlns:r="http://schemas.openxmlformats.org/officeDocument/2006/relationships" xmlns:p="http://schemas.openxmlformats.org/presentationml/2006/main">
   <p:cSld>
     <p:bg>
@@ -5131,254 +5293,6 @@
     <p:extLst>
       <p:ext uri="{BB962C8B-B14F-4D97-AF65-F5344CB8AC3E}">
         <p14:creationId xmlns:p14="http://schemas.microsoft.com/office/powerpoint/2010/main" val="3282389886"/>
-      </p:ext>
-    </p:extLst>
-  </p:cSld>
-  <p:clrMapOvr>
-    <a:masterClrMapping/>
-  </p:clrMapOvr>
-</p:sld>
-</file>
-
-<file path=ppt/slides/slide19.xml><?xml version="1.0" encoding="utf-8"?>
-<p:sld xmlns:a="http://schemas.openxmlformats.org/drawingml/2006/main" xmlns:r="http://schemas.openxmlformats.org/officeDocument/2006/relationships" xmlns:p="http://schemas.openxmlformats.org/presentationml/2006/main">
-  <p:cSld>
-    <p:bg>
-      <p:bgPr>
-        <a:solidFill>
-          <a:srgbClr val="FAF0E6"/>
-        </a:solidFill>
-        <a:effectLst/>
-      </p:bgPr>
-    </p:bg>
-    <p:spTree>
-      <p:nvGrpSpPr>
-        <p:cNvPr id="1" name="">
-          <a:extLst>
-            <a:ext uri="{FF2B5EF4-FFF2-40B4-BE49-F238E27FC236}">
-              <a16:creationId xmlns:a16="http://schemas.microsoft.com/office/drawing/2014/main" id="{B12C2438-6F39-1E74-B87F-C7E70AB4DA97}"/>
-            </a:ext>
-          </a:extLst>
-        </p:cNvPr>
-        <p:cNvGrpSpPr/>
-        <p:nvPr/>
-      </p:nvGrpSpPr>
-      <p:grpSpPr>
-        <a:xfrm>
-          <a:off x="0" y="0"/>
-          <a:ext cx="0" cy="0"/>
-          <a:chOff x="0" y="0"/>
-          <a:chExt cx="0" cy="0"/>
-        </a:xfrm>
-      </p:grpSpPr>
-      <p:sp>
-        <p:nvSpPr>
-          <p:cNvPr id="2" name="Title 1">
-            <a:extLst>
-              <a:ext uri="{FF2B5EF4-FFF2-40B4-BE49-F238E27FC236}">
-                <a16:creationId xmlns:a16="http://schemas.microsoft.com/office/drawing/2014/main" id="{9AE93777-B841-1FE9-B5E3-7E294CD7B927}"/>
-              </a:ext>
-            </a:extLst>
-          </p:cNvPr>
-          <p:cNvSpPr>
-            <a:spLocks noGrp="1"/>
-          </p:cNvSpPr>
-          <p:nvPr>
-            <p:ph type="title"/>
-          </p:nvPr>
-        </p:nvSpPr>
-        <p:spPr>
-          <a:xfrm>
-            <a:off x="919314" y="190464"/>
-            <a:ext cx="10515600" cy="1325563"/>
-          </a:xfrm>
-        </p:spPr>
-        <p:txBody>
-          <a:bodyPr/>
-          <a:lstStyle/>
-          <a:p>
-            <a:r>
-              <a:rPr lang="en-GB" dirty="0">
-                <a:solidFill>
-                  <a:srgbClr val="676767"/>
-                </a:solidFill>
-              </a:rPr>
-              <a:t>Summary</a:t>
-            </a:r>
-          </a:p>
-        </p:txBody>
-      </p:sp>
-      <p:sp>
-        <p:nvSpPr>
-          <p:cNvPr id="3" name="Content Placeholder 2">
-            <a:extLst>
-              <a:ext uri="{FF2B5EF4-FFF2-40B4-BE49-F238E27FC236}">
-                <a16:creationId xmlns:a16="http://schemas.microsoft.com/office/drawing/2014/main" id="{A81FB872-4B2A-7D41-78EA-741C258663A8}"/>
-              </a:ext>
-            </a:extLst>
-          </p:cNvPr>
-          <p:cNvSpPr>
-            <a:spLocks noGrp="1"/>
-          </p:cNvSpPr>
-          <p:nvPr>
-            <p:ph idx="1"/>
-          </p:nvPr>
-        </p:nvSpPr>
-        <p:spPr>
-          <a:xfrm>
-            <a:off x="838199" y="1413031"/>
-            <a:ext cx="10596715" cy="4906652"/>
-          </a:xfrm>
-          <a:solidFill>
-            <a:srgbClr val="FAF0E6"/>
-          </a:solidFill>
-        </p:spPr>
-        <p:txBody>
-          <a:bodyPr>
-            <a:normAutofit/>
-          </a:bodyPr>
-          <a:lstStyle/>
-          <a:p>
-            <a:r>
-              <a:rPr lang="en-GB" dirty="0"/>
-              <a:t>It has been 3 years since ChatGPT was released.</a:t>
-            </a:r>
-          </a:p>
-          <a:p>
-            <a:r>
-              <a:rPr lang="en-GB" dirty="0"/>
-              <a:t>The 6 months from arranging this talk to doing it is a very long time in AI with great changes in that time.</a:t>
-            </a:r>
-          </a:p>
-          <a:p>
-            <a:r>
-              <a:rPr lang="en-GB" dirty="0"/>
-              <a:t>The next 6 months/1 year/2 years?</a:t>
-            </a:r>
-          </a:p>
-          <a:p>
-            <a:endParaRPr lang="en-GB" dirty="0"/>
-          </a:p>
-          <a:p>
-            <a:pPr marL="0" indent="0">
-              <a:buNone/>
-            </a:pPr>
-            <a:r>
-              <a:rPr lang="en-GB" dirty="0">
-                <a:solidFill>
-                  <a:srgbClr val="3A3A3A"/>
-                </a:solidFill>
-              </a:rPr>
-              <a:t>Craig West</a:t>
-            </a:r>
-          </a:p>
-          <a:p>
-            <a:pPr marL="0" indent="0">
-              <a:buNone/>
-            </a:pPr>
-            <a:r>
-              <a:rPr lang="en-GB" dirty="0">
-                <a:solidFill>
-                  <a:srgbClr val="3A3A3A"/>
-                </a:solidFill>
-              </a:rPr>
-              <a:t>https://craig-west.netlify.app/</a:t>
-            </a:r>
-          </a:p>
-          <a:p>
-            <a:pPr marL="0" indent="0">
-              <a:buNone/>
-            </a:pPr>
-            <a:r>
-              <a:rPr lang="en-GB" dirty="0">
-                <a:solidFill>
-                  <a:srgbClr val="3A3A3A"/>
-                </a:solidFill>
-              </a:rPr>
-              <a:t>https://evaluating-ai-agents.com/</a:t>
-            </a:r>
-          </a:p>
-          <a:p>
-            <a:pPr marL="0" indent="0">
-              <a:buNone/>
-            </a:pPr>
-            <a:r>
-              <a:rPr lang="en-GB" dirty="0">
-                <a:solidFill>
-                  <a:srgbClr val="3A3A3A"/>
-                </a:solidFill>
-              </a:rPr>
-              <a:t>https://github.com/Python-Test-Engineer/earl2025</a:t>
-            </a:r>
-          </a:p>
-          <a:p>
-            <a:pPr marL="0" indent="0">
-              <a:buNone/>
-            </a:pPr>
-            <a:endParaRPr lang="en-GB" dirty="0">
-              <a:solidFill>
-                <a:srgbClr val="3A3A3A"/>
-              </a:solidFill>
-            </a:endParaRPr>
-          </a:p>
-          <a:p>
-            <a:pPr marL="0" indent="0">
-              <a:buNone/>
-            </a:pPr>
-            <a:endParaRPr lang="en-GB" dirty="0">
-              <a:solidFill>
-                <a:srgbClr val="3A3A3A"/>
-              </a:solidFill>
-            </a:endParaRPr>
-          </a:p>
-          <a:p>
-            <a:pPr marL="0" indent="0">
-              <a:buNone/>
-            </a:pPr>
-            <a:endParaRPr lang="en-GB" dirty="0"/>
-          </a:p>
-        </p:txBody>
-      </p:sp>
-      <p:pic>
-        <p:nvPicPr>
-          <p:cNvPr id="4" name="Picture 3" descr="A black background with a black square&#10;&#10;AI-generated content may be incorrect.">
-            <a:extLst>
-              <a:ext uri="{FF2B5EF4-FFF2-40B4-BE49-F238E27FC236}">
-                <a16:creationId xmlns:a16="http://schemas.microsoft.com/office/drawing/2014/main" id="{C2A3B412-5155-7A47-ABCA-B084173F68C6}"/>
-              </a:ext>
-            </a:extLst>
-          </p:cNvPr>
-          <p:cNvPicPr>
-            <a:picLocks noChangeAspect="1"/>
-          </p:cNvPicPr>
-          <p:nvPr/>
-        </p:nvPicPr>
-        <p:blipFill>
-          <a:blip r:embed="rId2">
-            <a:extLst>
-              <a:ext uri="{28A0092B-C50C-407E-A947-70E740481C1C}">
-                <a14:useLocalDpi xmlns:a14="http://schemas.microsoft.com/office/drawing/2010/main" val="0"/>
-              </a:ext>
-            </a:extLst>
-          </a:blip>
-          <a:stretch>
-            <a:fillRect/>
-          </a:stretch>
-        </p:blipFill>
-        <p:spPr>
-          <a:xfrm>
-            <a:off x="8517193" y="3215147"/>
-            <a:ext cx="2642419" cy="2642419"/>
-          </a:xfrm>
-          <a:prstGeom prst="rect">
-            <a:avLst/>
-          </a:prstGeom>
-        </p:spPr>
-      </p:pic>
-    </p:spTree>
-    <p:extLst>
-      <p:ext uri="{BB962C8B-B14F-4D97-AF65-F5344CB8AC3E}">
-        <p14:creationId xmlns:p14="http://schemas.microsoft.com/office/powerpoint/2010/main" val="2854764619"/>
       </p:ext>
     </p:extLst>
   </p:cSld>
@@ -5557,6 +5471,254 @@
     <p:extLst>
       <p:ext uri="{BB962C8B-B14F-4D97-AF65-F5344CB8AC3E}">
         <p14:creationId xmlns:p14="http://schemas.microsoft.com/office/powerpoint/2010/main" val="1008044863"/>
+      </p:ext>
+    </p:extLst>
+  </p:cSld>
+  <p:clrMapOvr>
+    <a:masterClrMapping/>
+  </p:clrMapOvr>
+</p:sld>
+</file>
+
+<file path=ppt/slides/slide20.xml><?xml version="1.0" encoding="utf-8"?>
+<p:sld xmlns:a="http://schemas.openxmlformats.org/drawingml/2006/main" xmlns:r="http://schemas.openxmlformats.org/officeDocument/2006/relationships" xmlns:p="http://schemas.openxmlformats.org/presentationml/2006/main">
+  <p:cSld>
+    <p:bg>
+      <p:bgPr>
+        <a:solidFill>
+          <a:srgbClr val="FAF0E6"/>
+        </a:solidFill>
+        <a:effectLst/>
+      </p:bgPr>
+    </p:bg>
+    <p:spTree>
+      <p:nvGrpSpPr>
+        <p:cNvPr id="1" name="">
+          <a:extLst>
+            <a:ext uri="{FF2B5EF4-FFF2-40B4-BE49-F238E27FC236}">
+              <a16:creationId xmlns:a16="http://schemas.microsoft.com/office/drawing/2014/main" id="{B12C2438-6F39-1E74-B87F-C7E70AB4DA97}"/>
+            </a:ext>
+          </a:extLst>
+        </p:cNvPr>
+        <p:cNvGrpSpPr/>
+        <p:nvPr/>
+      </p:nvGrpSpPr>
+      <p:grpSpPr>
+        <a:xfrm>
+          <a:off x="0" y="0"/>
+          <a:ext cx="0" cy="0"/>
+          <a:chOff x="0" y="0"/>
+          <a:chExt cx="0" cy="0"/>
+        </a:xfrm>
+      </p:grpSpPr>
+      <p:sp>
+        <p:nvSpPr>
+          <p:cNvPr id="2" name="Title 1">
+            <a:extLst>
+              <a:ext uri="{FF2B5EF4-FFF2-40B4-BE49-F238E27FC236}">
+                <a16:creationId xmlns:a16="http://schemas.microsoft.com/office/drawing/2014/main" id="{9AE93777-B841-1FE9-B5E3-7E294CD7B927}"/>
+              </a:ext>
+            </a:extLst>
+          </p:cNvPr>
+          <p:cNvSpPr>
+            <a:spLocks noGrp="1"/>
+          </p:cNvSpPr>
+          <p:nvPr>
+            <p:ph type="title"/>
+          </p:nvPr>
+        </p:nvSpPr>
+        <p:spPr>
+          <a:xfrm>
+            <a:off x="919314" y="190464"/>
+            <a:ext cx="10515600" cy="1325563"/>
+          </a:xfrm>
+        </p:spPr>
+        <p:txBody>
+          <a:bodyPr/>
+          <a:lstStyle/>
+          <a:p>
+            <a:r>
+              <a:rPr lang="en-GB" dirty="0">
+                <a:solidFill>
+                  <a:srgbClr val="676767"/>
+                </a:solidFill>
+              </a:rPr>
+              <a:t>Summary</a:t>
+            </a:r>
+          </a:p>
+        </p:txBody>
+      </p:sp>
+      <p:sp>
+        <p:nvSpPr>
+          <p:cNvPr id="3" name="Content Placeholder 2">
+            <a:extLst>
+              <a:ext uri="{FF2B5EF4-FFF2-40B4-BE49-F238E27FC236}">
+                <a16:creationId xmlns:a16="http://schemas.microsoft.com/office/drawing/2014/main" id="{A81FB872-4B2A-7D41-78EA-741C258663A8}"/>
+              </a:ext>
+            </a:extLst>
+          </p:cNvPr>
+          <p:cNvSpPr>
+            <a:spLocks noGrp="1"/>
+          </p:cNvSpPr>
+          <p:nvPr>
+            <p:ph idx="1"/>
+          </p:nvPr>
+        </p:nvSpPr>
+        <p:spPr>
+          <a:xfrm>
+            <a:off x="838199" y="1413031"/>
+            <a:ext cx="10596715" cy="4906652"/>
+          </a:xfrm>
+          <a:solidFill>
+            <a:srgbClr val="FAF0E6"/>
+          </a:solidFill>
+        </p:spPr>
+        <p:txBody>
+          <a:bodyPr>
+            <a:normAutofit/>
+          </a:bodyPr>
+          <a:lstStyle/>
+          <a:p>
+            <a:r>
+              <a:rPr lang="en-GB" dirty="0"/>
+              <a:t>It has been 3 years since ChatGPT was released.</a:t>
+            </a:r>
+          </a:p>
+          <a:p>
+            <a:r>
+              <a:rPr lang="en-GB" dirty="0"/>
+              <a:t>The 6 months from arranging this talk to doing it is a very long time in AI with great changes in that time.</a:t>
+            </a:r>
+          </a:p>
+          <a:p>
+            <a:r>
+              <a:rPr lang="en-GB" dirty="0"/>
+              <a:t>The next 6 months/1 year/2 years?</a:t>
+            </a:r>
+          </a:p>
+          <a:p>
+            <a:endParaRPr lang="en-GB" dirty="0"/>
+          </a:p>
+          <a:p>
+            <a:pPr marL="0" indent="0">
+              <a:buNone/>
+            </a:pPr>
+            <a:r>
+              <a:rPr lang="en-GB" dirty="0">
+                <a:solidFill>
+                  <a:srgbClr val="3A3A3A"/>
+                </a:solidFill>
+              </a:rPr>
+              <a:t>Craig West</a:t>
+            </a:r>
+          </a:p>
+          <a:p>
+            <a:pPr marL="0" indent="0">
+              <a:buNone/>
+            </a:pPr>
+            <a:r>
+              <a:rPr lang="en-GB" dirty="0">
+                <a:solidFill>
+                  <a:srgbClr val="3A3A3A"/>
+                </a:solidFill>
+              </a:rPr>
+              <a:t>https://craig-west.netlify.app/</a:t>
+            </a:r>
+          </a:p>
+          <a:p>
+            <a:pPr marL="0" indent="0">
+              <a:buNone/>
+            </a:pPr>
+            <a:r>
+              <a:rPr lang="en-GB" dirty="0">
+                <a:solidFill>
+                  <a:srgbClr val="3A3A3A"/>
+                </a:solidFill>
+              </a:rPr>
+              <a:t>https://evaluating-ai-agents.com/</a:t>
+            </a:r>
+          </a:p>
+          <a:p>
+            <a:pPr marL="0" indent="0">
+              <a:buNone/>
+            </a:pPr>
+            <a:r>
+              <a:rPr lang="en-GB" dirty="0">
+                <a:solidFill>
+                  <a:srgbClr val="3A3A3A"/>
+                </a:solidFill>
+              </a:rPr>
+              <a:t>https://github.com/Python-Test-Engineer/earl2025</a:t>
+            </a:r>
+          </a:p>
+          <a:p>
+            <a:pPr marL="0" indent="0">
+              <a:buNone/>
+            </a:pPr>
+            <a:endParaRPr lang="en-GB" dirty="0">
+              <a:solidFill>
+                <a:srgbClr val="3A3A3A"/>
+              </a:solidFill>
+            </a:endParaRPr>
+          </a:p>
+          <a:p>
+            <a:pPr marL="0" indent="0">
+              <a:buNone/>
+            </a:pPr>
+            <a:endParaRPr lang="en-GB" dirty="0">
+              <a:solidFill>
+                <a:srgbClr val="3A3A3A"/>
+              </a:solidFill>
+            </a:endParaRPr>
+          </a:p>
+          <a:p>
+            <a:pPr marL="0" indent="0">
+              <a:buNone/>
+            </a:pPr>
+            <a:endParaRPr lang="en-GB" dirty="0"/>
+          </a:p>
+        </p:txBody>
+      </p:sp>
+      <p:pic>
+        <p:nvPicPr>
+          <p:cNvPr id="4" name="Picture 3" descr="A black background with a black square&#10;&#10;AI-generated content may be incorrect.">
+            <a:extLst>
+              <a:ext uri="{FF2B5EF4-FFF2-40B4-BE49-F238E27FC236}">
+                <a16:creationId xmlns:a16="http://schemas.microsoft.com/office/drawing/2014/main" id="{C2A3B412-5155-7A47-ABCA-B084173F68C6}"/>
+              </a:ext>
+            </a:extLst>
+          </p:cNvPr>
+          <p:cNvPicPr>
+            <a:picLocks noChangeAspect="1"/>
+          </p:cNvPicPr>
+          <p:nvPr/>
+        </p:nvPicPr>
+        <p:blipFill>
+          <a:blip r:embed="rId2">
+            <a:extLst>
+              <a:ext uri="{28A0092B-C50C-407E-A947-70E740481C1C}">
+                <a14:useLocalDpi xmlns:a14="http://schemas.microsoft.com/office/drawing/2010/main" val="0"/>
+              </a:ext>
+            </a:extLst>
+          </a:blip>
+          <a:stretch>
+            <a:fillRect/>
+          </a:stretch>
+        </p:blipFill>
+        <p:spPr>
+          <a:xfrm>
+            <a:off x="8517193" y="3215147"/>
+            <a:ext cx="2642419" cy="2642419"/>
+          </a:xfrm>
+          <a:prstGeom prst="rect">
+            <a:avLst/>
+          </a:prstGeom>
+        </p:spPr>
+      </p:pic>
+    </p:spTree>
+    <p:extLst>
+      <p:ext uri="{BB962C8B-B14F-4D97-AF65-F5344CB8AC3E}">
+        <p14:creationId xmlns:p14="http://schemas.microsoft.com/office/powerpoint/2010/main" val="2854764619"/>
       </p:ext>
     </p:extLst>
   </p:cSld>

</xml_diff>

<commit_message>
add google crm agent
</commit_message>
<xml_diff>
--- a/AI_Agents_in_the_Data_Pipeline.pptx
+++ b/AI_Agents_in_the_Data_Pipeline.pptx
@@ -22,9 +22,11 @@
     <p:sldId id="272" r:id="rId16"/>
     <p:sldId id="266" r:id="rId17"/>
     <p:sldId id="277" r:id="rId18"/>
-    <p:sldId id="268" r:id="rId19"/>
-    <p:sldId id="278" r:id="rId20"/>
-    <p:sldId id="270" r:id="rId21"/>
+    <p:sldId id="280" r:id="rId19"/>
+    <p:sldId id="281" r:id="rId20"/>
+    <p:sldId id="268" r:id="rId21"/>
+    <p:sldId id="278" r:id="rId22"/>
+    <p:sldId id="270" r:id="rId23"/>
   </p:sldIdLst>
   <p:sldSz cx="12192000" cy="6858000"/>
   <p:notesSz cx="6858000" cy="9144000"/>
@@ -280,7 +282,7 @@
           <a:p>
             <a:fld id="{87B02A21-FE86-45F5-9B8B-75D343822DB2}" type="datetimeFigureOut">
               <a:rPr lang="en-GB" smtClean="0"/>
-              <a:t>12/08/2025</a:t>
+              <a:t>13/08/2025</a:t>
             </a:fld>
             <a:endParaRPr lang="en-GB"/>
           </a:p>
@@ -480,7 +482,7 @@
           <a:p>
             <a:fld id="{87B02A21-FE86-45F5-9B8B-75D343822DB2}" type="datetimeFigureOut">
               <a:rPr lang="en-GB" smtClean="0"/>
-              <a:t>12/08/2025</a:t>
+              <a:t>13/08/2025</a:t>
             </a:fld>
             <a:endParaRPr lang="en-GB"/>
           </a:p>
@@ -690,7 +692,7 @@
           <a:p>
             <a:fld id="{87B02A21-FE86-45F5-9B8B-75D343822DB2}" type="datetimeFigureOut">
               <a:rPr lang="en-GB" smtClean="0"/>
-              <a:t>12/08/2025</a:t>
+              <a:t>13/08/2025</a:t>
             </a:fld>
             <a:endParaRPr lang="en-GB"/>
           </a:p>
@@ -890,7 +892,7 @@
           <a:p>
             <a:fld id="{87B02A21-FE86-45F5-9B8B-75D343822DB2}" type="datetimeFigureOut">
               <a:rPr lang="en-GB" smtClean="0"/>
-              <a:t>12/08/2025</a:t>
+              <a:t>13/08/2025</a:t>
             </a:fld>
             <a:endParaRPr lang="en-GB"/>
           </a:p>
@@ -1166,7 +1168,7 @@
           <a:p>
             <a:fld id="{87B02A21-FE86-45F5-9B8B-75D343822DB2}" type="datetimeFigureOut">
               <a:rPr lang="en-GB" smtClean="0"/>
-              <a:t>12/08/2025</a:t>
+              <a:t>13/08/2025</a:t>
             </a:fld>
             <a:endParaRPr lang="en-GB"/>
           </a:p>
@@ -1434,7 +1436,7 @@
           <a:p>
             <a:fld id="{87B02A21-FE86-45F5-9B8B-75D343822DB2}" type="datetimeFigureOut">
               <a:rPr lang="en-GB" smtClean="0"/>
-              <a:t>12/08/2025</a:t>
+              <a:t>13/08/2025</a:t>
             </a:fld>
             <a:endParaRPr lang="en-GB"/>
           </a:p>
@@ -1849,7 +1851,7 @@
           <a:p>
             <a:fld id="{87B02A21-FE86-45F5-9B8B-75D343822DB2}" type="datetimeFigureOut">
               <a:rPr lang="en-GB" smtClean="0"/>
-              <a:t>12/08/2025</a:t>
+              <a:t>13/08/2025</a:t>
             </a:fld>
             <a:endParaRPr lang="en-GB"/>
           </a:p>
@@ -1991,7 +1993,7 @@
           <a:p>
             <a:fld id="{87B02A21-FE86-45F5-9B8B-75D343822DB2}" type="datetimeFigureOut">
               <a:rPr lang="en-GB" smtClean="0"/>
-              <a:t>12/08/2025</a:t>
+              <a:t>13/08/2025</a:t>
             </a:fld>
             <a:endParaRPr lang="en-GB"/>
           </a:p>
@@ -2104,7 +2106,7 @@
           <a:p>
             <a:fld id="{87B02A21-FE86-45F5-9B8B-75D343822DB2}" type="datetimeFigureOut">
               <a:rPr lang="en-GB" smtClean="0"/>
-              <a:t>12/08/2025</a:t>
+              <a:t>13/08/2025</a:t>
             </a:fld>
             <a:endParaRPr lang="en-GB"/>
           </a:p>
@@ -2417,7 +2419,7 @@
           <a:p>
             <a:fld id="{87B02A21-FE86-45F5-9B8B-75D343822DB2}" type="datetimeFigureOut">
               <a:rPr lang="en-GB" smtClean="0"/>
-              <a:t>12/08/2025</a:t>
+              <a:t>13/08/2025</a:t>
             </a:fld>
             <a:endParaRPr lang="en-GB"/>
           </a:p>
@@ -2706,7 +2708,7 @@
           <a:p>
             <a:fld id="{87B02A21-FE86-45F5-9B8B-75D343822DB2}" type="datetimeFigureOut">
               <a:rPr lang="en-GB" smtClean="0"/>
-              <a:t>12/08/2025</a:t>
+              <a:t>13/08/2025</a:t>
             </a:fld>
             <a:endParaRPr lang="en-GB"/>
           </a:p>
@@ -2949,7 +2951,7 @@
           <a:p>
             <a:fld id="{87B02A21-FE86-45F5-9B8B-75D343822DB2}" type="datetimeFigureOut">
               <a:rPr lang="en-GB" smtClean="0"/>
-              <a:t>12/08/2025</a:t>
+              <a:t>13/08/2025</a:t>
             </a:fld>
             <a:endParaRPr lang="en-GB"/>
           </a:p>
@@ -3776,17 +3778,20 @@
           </a:p>
           <a:p>
             <a:r>
-              <a:rPr lang="en-GB" dirty="0"/>
-              <a:t>We will run </a:t>
-            </a:r>
-            <a:r>
-              <a:rPr lang="en-GB" dirty="0">
+              <a:rPr lang="en-GB" sz="3600" dirty="0">
                 <a:highlight>
                   <a:srgbClr val="C0C0C0"/>
                 </a:highlight>
+                <a:latin typeface="Consolas" panose="020B0609020204030204" pitchFamily="49" charset="0"/>
               </a:rPr>
               <a:t>03_demo_tools_calulate_gross_price.ipynb</a:t>
             </a:r>
+            <a:endParaRPr lang="en-GB" sz="4000" dirty="0">
+              <a:highlight>
+                <a:srgbClr val="C0C0C0"/>
+              </a:highlight>
+              <a:latin typeface="Consolas" panose="020B0609020204030204" pitchFamily="49" charset="0"/>
+            </a:endParaRPr>
           </a:p>
           <a:p>
             <a:r>
@@ -4880,6 +4885,15 @@
               <a:t>Protocols, like HTTP for example, are implementations to enable communication between bits of code.</a:t>
             </a:r>
           </a:p>
+          <a:p>
+            <a:pPr marL="0" indent="0">
+              <a:buNone/>
+            </a:pPr>
+            <a:r>
+              <a:rPr lang="en-GB" i="1" dirty="0"/>
+              <a:t>Next…an example from Google…</a:t>
+            </a:r>
+          </a:p>
         </p:txBody>
       </p:sp>
     </p:spTree>
@@ -4911,7 +4925,7 @@
         <p:cNvPr id="1" name="">
           <a:extLst>
             <a:ext uri="{FF2B5EF4-FFF2-40B4-BE49-F238E27FC236}">
-              <a16:creationId xmlns:a16="http://schemas.microsoft.com/office/drawing/2014/main" id="{586C0DD9-54D0-8094-782E-FC61A05AFDE9}"/>
+              <a16:creationId xmlns:a16="http://schemas.microsoft.com/office/drawing/2014/main" id="{1AA440AF-DD92-7905-6BC8-EE77381BAEAB}"/>
             </a:ext>
           </a:extLst>
         </p:cNvPr>
@@ -4931,7 +4945,7 @@
           <p:cNvPr id="2" name="Title 1">
             <a:extLst>
               <a:ext uri="{FF2B5EF4-FFF2-40B4-BE49-F238E27FC236}">
-                <a16:creationId xmlns:a16="http://schemas.microsoft.com/office/drawing/2014/main" id="{8E79AD40-FA5F-10FF-8715-DCEC72D39FD8}"/>
+                <a16:creationId xmlns:a16="http://schemas.microsoft.com/office/drawing/2014/main" id="{1A15E1A2-83B2-14F0-BFEA-861422733F26}"/>
               </a:ext>
             </a:extLst>
           </p:cNvPr>
@@ -4958,73 +4972,53 @@
                   <a:srgbClr val="676767"/>
                 </a:solidFill>
               </a:rPr>
-              <a:t>A complete demo (1)</a:t>
-            </a:r>
-          </a:p>
-        </p:txBody>
-      </p:sp>
-      <p:sp>
-        <p:nvSpPr>
-          <p:cNvPr id="3" name="Content Placeholder 2">
-            <a:extLst>
-              <a:ext uri="{FF2B5EF4-FFF2-40B4-BE49-F238E27FC236}">
-                <a16:creationId xmlns:a16="http://schemas.microsoft.com/office/drawing/2014/main" id="{E4FAB0A6-D1CF-DAFA-F9DD-82A1E0998A46}"/>
-              </a:ext>
-            </a:extLst>
-          </p:cNvPr>
-          <p:cNvSpPr>
-            <a:spLocks noGrp="1"/>
-          </p:cNvSpPr>
+              <a:t>Google CRM Agent (1)</a:t>
+            </a:r>
+          </a:p>
+        </p:txBody>
+      </p:sp>
+      <p:pic>
+        <p:nvPicPr>
+          <p:cNvPr id="5" name="Content Placeholder 4" descr="A diagram of a business&#10;&#10;AI-generated content may be incorrect.">
+            <a:extLst>
+              <a:ext uri="{FF2B5EF4-FFF2-40B4-BE49-F238E27FC236}">
+                <a16:creationId xmlns:a16="http://schemas.microsoft.com/office/drawing/2014/main" id="{35C7062D-4D91-6909-2AFE-1BD94FA2B192}"/>
+              </a:ext>
+            </a:extLst>
+          </p:cNvPr>
+          <p:cNvPicPr>
+            <a:picLocks noGrp="1" noChangeAspect="1"/>
+          </p:cNvPicPr>
           <p:nvPr>
             <p:ph idx="1"/>
           </p:nvPr>
-        </p:nvSpPr>
-        <p:spPr>
-          <a:xfrm>
-            <a:off x="919314" y="2584285"/>
-            <a:ext cx="10596715" cy="2316488"/>
+        </p:nvPicPr>
+        <p:blipFill>
+          <a:blip r:embed="rId2">
+            <a:extLst>
+              <a:ext uri="{28A0092B-C50C-407E-A947-70E740481C1C}">
+                <a14:useLocalDpi xmlns:a14="http://schemas.microsoft.com/office/drawing/2010/main" val="0"/>
+              </a:ext>
+            </a:extLst>
+          </a:blip>
+          <a:stretch>
+            <a:fillRect/>
+          </a:stretch>
+        </p:blipFill>
+        <p:spPr>
+          <a:xfrm>
+            <a:off x="878832" y="1421289"/>
+            <a:ext cx="10596563" cy="4870469"/>
           </a:xfrm>
           <a:solidFill>
             <a:srgbClr val="FAF0E6"/>
           </a:solidFill>
         </p:spPr>
-        <p:txBody>
-          <a:bodyPr>
-            <a:normAutofit/>
-          </a:bodyPr>
-          <a:lstStyle/>
-          <a:p>
-            <a:pPr marL="0" indent="0">
-              <a:buNone/>
-            </a:pPr>
-            <a:r>
-              <a:rPr lang="en-GB" dirty="0"/>
-              <a:t>Using Cline to create a complete pipeline…in practice </a:t>
-            </a:r>
-            <a:r>
-              <a:rPr lang="en-GB" dirty="0" err="1"/>
-              <a:t>devs</a:t>
-            </a:r>
-            <a:r>
-              <a:rPr lang="en-GB" dirty="0"/>
-              <a:t> do it bit by bit.</a:t>
-            </a:r>
-          </a:p>
-          <a:p>
-            <a:pPr marL="0" indent="0">
-              <a:buNone/>
-            </a:pPr>
-            <a:r>
-              <a:rPr lang="en-GB" dirty="0"/>
-              <a:t>Let’s look at an example…</a:t>
-            </a:r>
-          </a:p>
-        </p:txBody>
-      </p:sp>
+      </p:pic>
     </p:spTree>
     <p:extLst>
       <p:ext uri="{BB962C8B-B14F-4D97-AF65-F5344CB8AC3E}">
-        <p14:creationId xmlns:p14="http://schemas.microsoft.com/office/powerpoint/2010/main" val="3901758580"/>
+        <p14:creationId xmlns:p14="http://schemas.microsoft.com/office/powerpoint/2010/main" val="3279871281"/>
       </p:ext>
     </p:extLst>
   </p:cSld>
@@ -5050,7 +5044,7 @@
         <p:cNvPr id="1" name="">
           <a:extLst>
             <a:ext uri="{FF2B5EF4-FFF2-40B4-BE49-F238E27FC236}">
-              <a16:creationId xmlns:a16="http://schemas.microsoft.com/office/drawing/2014/main" id="{C7B79118-841B-F42B-B854-886D9D8F1A5A}"/>
+              <a16:creationId xmlns:a16="http://schemas.microsoft.com/office/drawing/2014/main" id="{CB0030CE-F294-86B3-6F10-3AB61987FE26}"/>
             </a:ext>
           </a:extLst>
         </p:cNvPr>
@@ -5065,12 +5059,48 @@
           <a:chExt cx="0" cy="0"/>
         </a:xfrm>
       </p:grpSpPr>
+      <p:pic>
+        <p:nvPicPr>
+          <p:cNvPr id="7" name="Picture 6" descr="A screenshot of a computer&#10;&#10;AI-generated content may be incorrect.">
+            <a:extLst>
+              <a:ext uri="{FF2B5EF4-FFF2-40B4-BE49-F238E27FC236}">
+                <a16:creationId xmlns:a16="http://schemas.microsoft.com/office/drawing/2014/main" id="{EF3853CA-F183-DF85-201B-ED2AB55C4669}"/>
+              </a:ext>
+            </a:extLst>
+          </p:cNvPr>
+          <p:cNvPicPr>
+            <a:picLocks noChangeAspect="1"/>
+          </p:cNvPicPr>
+          <p:nvPr/>
+        </p:nvPicPr>
+        <p:blipFill>
+          <a:blip r:embed="rId2">
+            <a:extLst>
+              <a:ext uri="{28A0092B-C50C-407E-A947-70E740481C1C}">
+                <a14:useLocalDpi xmlns:a14="http://schemas.microsoft.com/office/drawing/2010/main" val="0"/>
+              </a:ext>
+            </a:extLst>
+          </a:blip>
+          <a:stretch>
+            <a:fillRect/>
+          </a:stretch>
+        </p:blipFill>
+        <p:spPr>
+          <a:xfrm>
+            <a:off x="6782929" y="1969851"/>
+            <a:ext cx="4972442" cy="4165477"/>
+          </a:xfrm>
+          <a:prstGeom prst="rect">
+            <a:avLst/>
+          </a:prstGeom>
+        </p:spPr>
+      </p:pic>
       <p:sp>
         <p:nvSpPr>
           <p:cNvPr id="2" name="Title 1">
             <a:extLst>
               <a:ext uri="{FF2B5EF4-FFF2-40B4-BE49-F238E27FC236}">
-                <a16:creationId xmlns:a16="http://schemas.microsoft.com/office/drawing/2014/main" id="{2450BE5E-7827-40D5-0232-6BCA156E0B21}"/>
+                <a16:creationId xmlns:a16="http://schemas.microsoft.com/office/drawing/2014/main" id="{60345D98-D59A-10E5-7C50-C924EE888534}"/>
               </a:ext>
             </a:extLst>
           </p:cNvPr>
@@ -5097,17 +5127,17 @@
                   <a:srgbClr val="676767"/>
                 </a:solidFill>
               </a:rPr>
-              <a:t>A complete demo (2)</a:t>
-            </a:r>
-          </a:p>
-        </p:txBody>
-      </p:sp>
-      <p:sp>
-        <p:nvSpPr>
-          <p:cNvPr id="3" name="Content Placeholder 2">
-            <a:extLst>
-              <a:ext uri="{FF2B5EF4-FFF2-40B4-BE49-F238E27FC236}">
-                <a16:creationId xmlns:a16="http://schemas.microsoft.com/office/drawing/2014/main" id="{A51F56F5-9707-600C-AB09-0FA01DFE213C}"/>
+              <a:t>Google CRM Agent (2)</a:t>
+            </a:r>
+          </a:p>
+        </p:txBody>
+      </p:sp>
+      <p:sp>
+        <p:nvSpPr>
+          <p:cNvPr id="4" name="Content Placeholder 3">
+            <a:extLst>
+              <a:ext uri="{FF2B5EF4-FFF2-40B4-BE49-F238E27FC236}">
+                <a16:creationId xmlns:a16="http://schemas.microsoft.com/office/drawing/2014/main" id="{92A58150-C7BB-C968-2A62-2A3812D748E7}"/>
               </a:ext>
             </a:extLst>
           </p:cNvPr>
@@ -5120,38 +5150,41 @@
         </p:nvSpPr>
         <p:spPr>
           <a:xfrm>
-            <a:off x="1001507" y="1351387"/>
-            <a:ext cx="10596715" cy="2717179"/>
-          </a:xfrm>
-          <a:solidFill>
-            <a:srgbClr val="FAF0E6"/>
-          </a:solidFill>
-        </p:spPr>
-        <p:txBody>
-          <a:bodyPr>
-            <a:normAutofit fontScale="25000" lnSpcReduction="20000"/>
-          </a:bodyPr>
-          <a:lstStyle/>
+            <a:off x="919314" y="1516027"/>
+            <a:ext cx="10515600" cy="4351338"/>
+          </a:xfrm>
+        </p:spPr>
+        <p:txBody>
+          <a:bodyPr/>
+          <a:lstStyle/>
+          <a:p>
+            <a:r>
+              <a:rPr lang="en-GB" sz="1600" dirty="0">
+                <a:hlinkClick r:id="rId3"/>
+              </a:rPr>
+              <a:t>https://github.com/vladkol/crm-data-agent/blob/main/src/agents/data_agent/prompts/crm_business_analyst.py</a:t>
+            </a:r>
+            <a:endParaRPr lang="en-GB" sz="1600" dirty="0"/>
+          </a:p>
+          <a:p>
+            <a:r>
+              <a:rPr lang="en-GB" dirty="0"/>
+              <a:t>06_demo_prompt_google_crm.md</a:t>
+            </a:r>
+          </a:p>
           <a:p>
             <a:pPr marL="0" indent="0">
               <a:buNone/>
             </a:pPr>
-            <a:r>
-              <a:rPr lang="en-GB" sz="11200" b="1" dirty="0"/>
-              <a:t>CLAUDE</a:t>
-            </a:r>
-            <a:r>
-              <a:rPr lang="en-GB" sz="9600" b="1" dirty="0"/>
-              <a:t>: </a:t>
-            </a:r>
+            <a:endParaRPr lang="en-GB" dirty="0"/>
           </a:p>
           <a:p>
             <a:pPr marL="0" indent="0">
               <a:buNone/>
             </a:pPr>
             <a:r>
-              <a:rPr lang="en-GB" sz="7200" dirty="0"/>
-              <a:t>create a simple sales csv with just 5 rows</a:t>
+              <a:rPr lang="en-GB" dirty="0"/>
+              <a:t>We can learn a lot about best</a:t>
             </a:r>
           </a:p>
           <a:p>
@@ -5159,12 +5192,8 @@
               <a:buNone/>
             </a:pPr>
             <a:r>
-              <a:rPr lang="en-GB" sz="7200" dirty="0" err="1"/>
-              <a:t>sales_data</a:t>
-            </a:r>
-            <a:r>
-              <a:rPr lang="en-GB" sz="7200" dirty="0"/>
-              <a:t> = [</a:t>
+              <a:rPr lang="en-GB" dirty="0"/>
+              <a:t>practices for Context Engineering by </a:t>
             </a:r>
           </a:p>
           <a:p>
@@ -5172,127 +5201,19 @@
               <a:buNone/>
             </a:pPr>
             <a:r>
-              <a:rPr lang="en-GB" sz="7200" dirty="0"/>
-              <a:t>    ['Date', 'Product', 'Quantity', '</a:t>
-            </a:r>
-            <a:r>
-              <a:rPr lang="en-GB" sz="7200" dirty="0" err="1"/>
-              <a:t>Unit_Price</a:t>
-            </a:r>
-            <a:r>
-              <a:rPr lang="en-GB" sz="7200" dirty="0"/>
-              <a:t>', 'Total'],</a:t>
-            </a:r>
-          </a:p>
-          <a:p>
-            <a:pPr marL="0" indent="0">
-              <a:buNone/>
-            </a:pPr>
-            <a:r>
-              <a:rPr lang="en-GB" sz="7200" dirty="0"/>
-              <a:t>    ['2024-01-15', 'Laptop', 2, 999.99, 1999.98],</a:t>
-            </a:r>
-          </a:p>
-          <a:p>
-            <a:pPr marL="0" indent="0">
-              <a:buNone/>
-            </a:pPr>
-            <a:r>
-              <a:rPr lang="en-GB" sz="7200" dirty="0"/>
-              <a:t>    ['2024-01-16', 'Mouse', 5, 29.99, 149.95],</a:t>
-            </a:r>
-          </a:p>
-          <a:p>
-            <a:pPr marL="0" indent="0">
-              <a:buNone/>
-            </a:pPr>
-            <a:r>
-              <a:rPr lang="en-GB" sz="7200" dirty="0"/>
-              <a:t>    ['2024-01-17', 'Keyboard', 3, 79.99, 239.97],</a:t>
-            </a:r>
-          </a:p>
-          <a:p>
-            <a:pPr marL="0" indent="0">
-              <a:buNone/>
-            </a:pPr>
-            <a:r>
-              <a:rPr lang="en-GB" sz="7200" dirty="0"/>
-              <a:t>    ['2024-01-18', 'Monitor', 1, 299.99, 299.99],</a:t>
-            </a:r>
-          </a:p>
-          <a:p>
-            <a:pPr marL="0" indent="0">
-              <a:buNone/>
-            </a:pPr>
-            <a:r>
-              <a:rPr lang="en-GB" sz="7200" dirty="0"/>
-              <a:t>    ['2024-01-19', 'Headphones', 4, 149.99, 599.96]</a:t>
-            </a:r>
-          </a:p>
-          <a:p>
-            <a:pPr marL="0" indent="0">
-              <a:buNone/>
-            </a:pPr>
-            <a:r>
               <a:rPr lang="en-GB" dirty="0"/>
-              <a:t>]</a:t>
-            </a:r>
-            <a:endParaRPr lang="en-GB" sz="4400" dirty="0"/>
-          </a:p>
-          <a:p>
-            <a:pPr marL="0" indent="0">
-              <a:buNone/>
-            </a:pPr>
-            <a:r>
-              <a:rPr lang="en-GB" sz="11200" b="1" dirty="0"/>
-              <a:t>CLINE:</a:t>
-            </a:r>
-          </a:p>
-          <a:p>
-            <a:pPr marL="0" indent="0">
-              <a:buNone/>
-            </a:pPr>
-            <a:r>
-              <a:rPr lang="en-GB" sz="8000" dirty="0"/>
-              <a:t>“I have a CSV for some sales data. Make a simple ETL and data analysis programme for it to show plots and graphs.”</a:t>
-            </a:r>
-          </a:p>
-          <a:p>
-            <a:pPr marL="0" indent="0">
-              <a:buNone/>
-            </a:pPr>
-            <a:r>
-              <a:rPr lang="en-GB" sz="11200" b="1" dirty="0"/>
-              <a:t>IN DEMO:  </a:t>
-            </a:r>
-            <a:r>
-              <a:rPr lang="en-GB" sz="8000" dirty="0"/>
-              <a:t>I will add…</a:t>
-            </a:r>
-          </a:p>
-          <a:p>
-            <a:pPr marL="0" indent="0">
-              <a:buNone/>
-            </a:pPr>
-            <a:r>
-              <a:rPr lang="en-GB" sz="8000" dirty="0"/>
-              <a:t>[“There is a folder already called `</a:t>
-            </a:r>
-            <a:r>
-              <a:rPr lang="en-GB" sz="8000" dirty="0" err="1"/>
-              <a:t>sales_etl_analysis</a:t>
-            </a:r>
-            <a:r>
-              <a:rPr lang="en-GB" sz="8000" dirty="0"/>
-              <a:t>` - please ignore and start afresh”]</a:t>
-            </a:r>
+              <a:t>looking at big tech repos.</a:t>
+            </a:r>
+          </a:p>
+          <a:p>
+            <a:endParaRPr lang="en-GB" dirty="0"/>
           </a:p>
         </p:txBody>
       </p:sp>
     </p:spTree>
     <p:extLst>
       <p:ext uri="{BB962C8B-B14F-4D97-AF65-F5344CB8AC3E}">
-        <p14:creationId xmlns:p14="http://schemas.microsoft.com/office/powerpoint/2010/main" val="3282389886"/>
+        <p14:creationId xmlns:p14="http://schemas.microsoft.com/office/powerpoint/2010/main" val="3831430507"/>
       </p:ext>
     </p:extLst>
   </p:cSld>
@@ -5481,6 +5402,413 @@
 </file>
 
 <file path=ppt/slides/slide20.xml><?xml version="1.0" encoding="utf-8"?>
+<p:sld xmlns:a="http://schemas.openxmlformats.org/drawingml/2006/main" xmlns:r="http://schemas.openxmlformats.org/officeDocument/2006/relationships" xmlns:p="http://schemas.openxmlformats.org/presentationml/2006/main">
+  <p:cSld>
+    <p:bg>
+      <p:bgPr>
+        <a:solidFill>
+          <a:srgbClr val="FAF0E6"/>
+        </a:solidFill>
+        <a:effectLst/>
+      </p:bgPr>
+    </p:bg>
+    <p:spTree>
+      <p:nvGrpSpPr>
+        <p:cNvPr id="1" name="">
+          <a:extLst>
+            <a:ext uri="{FF2B5EF4-FFF2-40B4-BE49-F238E27FC236}">
+              <a16:creationId xmlns:a16="http://schemas.microsoft.com/office/drawing/2014/main" id="{586C0DD9-54D0-8094-782E-FC61A05AFDE9}"/>
+            </a:ext>
+          </a:extLst>
+        </p:cNvPr>
+        <p:cNvGrpSpPr/>
+        <p:nvPr/>
+      </p:nvGrpSpPr>
+      <p:grpSpPr>
+        <a:xfrm>
+          <a:off x="0" y="0"/>
+          <a:ext cx="0" cy="0"/>
+          <a:chOff x="0" y="0"/>
+          <a:chExt cx="0" cy="0"/>
+        </a:xfrm>
+      </p:grpSpPr>
+      <p:sp>
+        <p:nvSpPr>
+          <p:cNvPr id="2" name="Title 1">
+            <a:extLst>
+              <a:ext uri="{FF2B5EF4-FFF2-40B4-BE49-F238E27FC236}">
+                <a16:creationId xmlns:a16="http://schemas.microsoft.com/office/drawing/2014/main" id="{8E79AD40-FA5F-10FF-8715-DCEC72D39FD8}"/>
+              </a:ext>
+            </a:extLst>
+          </p:cNvPr>
+          <p:cNvSpPr>
+            <a:spLocks noGrp="1"/>
+          </p:cNvSpPr>
+          <p:nvPr>
+            <p:ph type="title"/>
+          </p:nvPr>
+        </p:nvSpPr>
+        <p:spPr>
+          <a:xfrm>
+            <a:off x="919314" y="190464"/>
+            <a:ext cx="10515600" cy="1325563"/>
+          </a:xfrm>
+        </p:spPr>
+        <p:txBody>
+          <a:bodyPr/>
+          <a:lstStyle/>
+          <a:p>
+            <a:r>
+              <a:rPr lang="en-GB" dirty="0">
+                <a:solidFill>
+                  <a:srgbClr val="676767"/>
+                </a:solidFill>
+              </a:rPr>
+              <a:t>A complete demo (1)</a:t>
+            </a:r>
+          </a:p>
+        </p:txBody>
+      </p:sp>
+      <p:sp>
+        <p:nvSpPr>
+          <p:cNvPr id="3" name="Content Placeholder 2">
+            <a:extLst>
+              <a:ext uri="{FF2B5EF4-FFF2-40B4-BE49-F238E27FC236}">
+                <a16:creationId xmlns:a16="http://schemas.microsoft.com/office/drawing/2014/main" id="{E4FAB0A6-D1CF-DAFA-F9DD-82A1E0998A46}"/>
+              </a:ext>
+            </a:extLst>
+          </p:cNvPr>
+          <p:cNvSpPr>
+            <a:spLocks noGrp="1"/>
+          </p:cNvSpPr>
+          <p:nvPr>
+            <p:ph idx="1"/>
+          </p:nvPr>
+        </p:nvSpPr>
+        <p:spPr>
+          <a:xfrm>
+            <a:off x="919314" y="2584285"/>
+            <a:ext cx="10596715" cy="2316488"/>
+          </a:xfrm>
+          <a:solidFill>
+            <a:srgbClr val="FAF0E6"/>
+          </a:solidFill>
+        </p:spPr>
+        <p:txBody>
+          <a:bodyPr>
+            <a:normAutofit/>
+          </a:bodyPr>
+          <a:lstStyle/>
+          <a:p>
+            <a:pPr marL="0" indent="0">
+              <a:buNone/>
+            </a:pPr>
+            <a:r>
+              <a:rPr lang="en-GB" dirty="0"/>
+              <a:t>Using Cline to create a complete pipeline…in practice </a:t>
+            </a:r>
+            <a:r>
+              <a:rPr lang="en-GB" dirty="0" err="1"/>
+              <a:t>devs</a:t>
+            </a:r>
+            <a:r>
+              <a:rPr lang="en-GB" dirty="0"/>
+              <a:t> do it bit by bit.</a:t>
+            </a:r>
+          </a:p>
+          <a:p>
+            <a:pPr marL="0" indent="0">
+              <a:buNone/>
+            </a:pPr>
+            <a:r>
+              <a:rPr lang="en-GB" dirty="0"/>
+              <a:t>Let’s look at an example…</a:t>
+            </a:r>
+          </a:p>
+        </p:txBody>
+      </p:sp>
+    </p:spTree>
+    <p:extLst>
+      <p:ext uri="{BB962C8B-B14F-4D97-AF65-F5344CB8AC3E}">
+        <p14:creationId xmlns:p14="http://schemas.microsoft.com/office/powerpoint/2010/main" val="3901758580"/>
+      </p:ext>
+    </p:extLst>
+  </p:cSld>
+  <p:clrMapOvr>
+    <a:masterClrMapping/>
+  </p:clrMapOvr>
+</p:sld>
+</file>
+
+<file path=ppt/slides/slide21.xml><?xml version="1.0" encoding="utf-8"?>
+<p:sld xmlns:a="http://schemas.openxmlformats.org/drawingml/2006/main" xmlns:r="http://schemas.openxmlformats.org/officeDocument/2006/relationships" xmlns:p="http://schemas.openxmlformats.org/presentationml/2006/main">
+  <p:cSld>
+    <p:bg>
+      <p:bgPr>
+        <a:solidFill>
+          <a:srgbClr val="FAF0E6"/>
+        </a:solidFill>
+        <a:effectLst/>
+      </p:bgPr>
+    </p:bg>
+    <p:spTree>
+      <p:nvGrpSpPr>
+        <p:cNvPr id="1" name="">
+          <a:extLst>
+            <a:ext uri="{FF2B5EF4-FFF2-40B4-BE49-F238E27FC236}">
+              <a16:creationId xmlns:a16="http://schemas.microsoft.com/office/drawing/2014/main" id="{C7B79118-841B-F42B-B854-886D9D8F1A5A}"/>
+            </a:ext>
+          </a:extLst>
+        </p:cNvPr>
+        <p:cNvGrpSpPr/>
+        <p:nvPr/>
+      </p:nvGrpSpPr>
+      <p:grpSpPr>
+        <a:xfrm>
+          <a:off x="0" y="0"/>
+          <a:ext cx="0" cy="0"/>
+          <a:chOff x="0" y="0"/>
+          <a:chExt cx="0" cy="0"/>
+        </a:xfrm>
+      </p:grpSpPr>
+      <p:sp>
+        <p:nvSpPr>
+          <p:cNvPr id="2" name="Title 1">
+            <a:extLst>
+              <a:ext uri="{FF2B5EF4-FFF2-40B4-BE49-F238E27FC236}">
+                <a16:creationId xmlns:a16="http://schemas.microsoft.com/office/drawing/2014/main" id="{2450BE5E-7827-40D5-0232-6BCA156E0B21}"/>
+              </a:ext>
+            </a:extLst>
+          </p:cNvPr>
+          <p:cNvSpPr>
+            <a:spLocks noGrp="1"/>
+          </p:cNvSpPr>
+          <p:nvPr>
+            <p:ph type="title"/>
+          </p:nvPr>
+        </p:nvSpPr>
+        <p:spPr>
+          <a:xfrm>
+            <a:off x="919314" y="190464"/>
+            <a:ext cx="10515600" cy="1325563"/>
+          </a:xfrm>
+        </p:spPr>
+        <p:txBody>
+          <a:bodyPr/>
+          <a:lstStyle/>
+          <a:p>
+            <a:r>
+              <a:rPr lang="en-GB" dirty="0">
+                <a:solidFill>
+                  <a:srgbClr val="676767"/>
+                </a:solidFill>
+              </a:rPr>
+              <a:t>A complete demo (2)</a:t>
+            </a:r>
+          </a:p>
+        </p:txBody>
+      </p:sp>
+      <p:sp>
+        <p:nvSpPr>
+          <p:cNvPr id="3" name="Content Placeholder 2">
+            <a:extLst>
+              <a:ext uri="{FF2B5EF4-FFF2-40B4-BE49-F238E27FC236}">
+                <a16:creationId xmlns:a16="http://schemas.microsoft.com/office/drawing/2014/main" id="{A51F56F5-9707-600C-AB09-0FA01DFE213C}"/>
+              </a:ext>
+            </a:extLst>
+          </p:cNvPr>
+          <p:cNvSpPr>
+            <a:spLocks noGrp="1"/>
+          </p:cNvSpPr>
+          <p:nvPr>
+            <p:ph idx="1"/>
+          </p:nvPr>
+        </p:nvSpPr>
+        <p:spPr>
+          <a:xfrm>
+            <a:off x="1001507" y="1351387"/>
+            <a:ext cx="10596715" cy="2717179"/>
+          </a:xfrm>
+          <a:solidFill>
+            <a:srgbClr val="FAF0E6"/>
+          </a:solidFill>
+        </p:spPr>
+        <p:txBody>
+          <a:bodyPr>
+            <a:normAutofit fontScale="25000" lnSpcReduction="20000"/>
+          </a:bodyPr>
+          <a:lstStyle/>
+          <a:p>
+            <a:pPr marL="0" indent="0">
+              <a:buNone/>
+            </a:pPr>
+            <a:r>
+              <a:rPr lang="en-GB" sz="11200" b="1" dirty="0"/>
+              <a:t>CLAUDE</a:t>
+            </a:r>
+            <a:r>
+              <a:rPr lang="en-GB" sz="9600" b="1" dirty="0"/>
+              <a:t>: </a:t>
+            </a:r>
+          </a:p>
+          <a:p>
+            <a:pPr marL="0" indent="0">
+              <a:buNone/>
+            </a:pPr>
+            <a:r>
+              <a:rPr lang="en-GB" sz="7200" dirty="0"/>
+              <a:t>create a simple sales csv with just 5 rows</a:t>
+            </a:r>
+          </a:p>
+          <a:p>
+            <a:pPr marL="0" indent="0">
+              <a:buNone/>
+            </a:pPr>
+            <a:r>
+              <a:rPr lang="en-GB" sz="7200" dirty="0" err="1"/>
+              <a:t>sales_data</a:t>
+            </a:r>
+            <a:r>
+              <a:rPr lang="en-GB" sz="7200" dirty="0"/>
+              <a:t> = [</a:t>
+            </a:r>
+          </a:p>
+          <a:p>
+            <a:pPr marL="0" indent="0">
+              <a:buNone/>
+            </a:pPr>
+            <a:r>
+              <a:rPr lang="en-GB" sz="7200" dirty="0"/>
+              <a:t>    ['Date', 'Product', 'Quantity', '</a:t>
+            </a:r>
+            <a:r>
+              <a:rPr lang="en-GB" sz="7200" dirty="0" err="1"/>
+              <a:t>Unit_Price</a:t>
+            </a:r>
+            <a:r>
+              <a:rPr lang="en-GB" sz="7200" dirty="0"/>
+              <a:t>', 'Total'],</a:t>
+            </a:r>
+          </a:p>
+          <a:p>
+            <a:pPr marL="0" indent="0">
+              <a:buNone/>
+            </a:pPr>
+            <a:r>
+              <a:rPr lang="en-GB" sz="7200" dirty="0"/>
+              <a:t>    ['2024-01-15', 'Laptop', 2, 999.99, 1999.98],</a:t>
+            </a:r>
+          </a:p>
+          <a:p>
+            <a:pPr marL="0" indent="0">
+              <a:buNone/>
+            </a:pPr>
+            <a:r>
+              <a:rPr lang="en-GB" sz="7200" dirty="0"/>
+              <a:t>    ['2024-01-16', 'Mouse', 5, 29.99, 149.95],</a:t>
+            </a:r>
+          </a:p>
+          <a:p>
+            <a:pPr marL="0" indent="0">
+              <a:buNone/>
+            </a:pPr>
+            <a:r>
+              <a:rPr lang="en-GB" sz="7200" dirty="0"/>
+              <a:t>    ['2024-01-17', 'Keyboard', 3, 79.99, 239.97],</a:t>
+            </a:r>
+          </a:p>
+          <a:p>
+            <a:pPr marL="0" indent="0">
+              <a:buNone/>
+            </a:pPr>
+            <a:r>
+              <a:rPr lang="en-GB" sz="7200" dirty="0"/>
+              <a:t>    ['2024-01-18', 'Monitor', 1, 299.99, 299.99],</a:t>
+            </a:r>
+          </a:p>
+          <a:p>
+            <a:pPr marL="0" indent="0">
+              <a:buNone/>
+            </a:pPr>
+            <a:r>
+              <a:rPr lang="en-GB" sz="7200" dirty="0"/>
+              <a:t>    ['2024-01-19', 'Headphones', 4, 149.99, 599.96]</a:t>
+            </a:r>
+          </a:p>
+          <a:p>
+            <a:pPr marL="0" indent="0">
+              <a:buNone/>
+            </a:pPr>
+            <a:r>
+              <a:rPr lang="en-GB" dirty="0"/>
+              <a:t>]</a:t>
+            </a:r>
+            <a:endParaRPr lang="en-GB" sz="4400" dirty="0"/>
+          </a:p>
+          <a:p>
+            <a:pPr marL="0" indent="0">
+              <a:buNone/>
+            </a:pPr>
+            <a:r>
+              <a:rPr lang="en-GB" sz="11200" b="1" dirty="0"/>
+              <a:t>CLINE:</a:t>
+            </a:r>
+          </a:p>
+          <a:p>
+            <a:pPr marL="0" indent="0">
+              <a:buNone/>
+            </a:pPr>
+            <a:r>
+              <a:rPr lang="en-GB" sz="8000" dirty="0"/>
+              <a:t>“I have a CSV for some sales data. Make a simple ETL and data analysis programme for it to show plots and graphs.”</a:t>
+            </a:r>
+          </a:p>
+          <a:p>
+            <a:pPr marL="0" indent="0">
+              <a:buNone/>
+            </a:pPr>
+            <a:r>
+              <a:rPr lang="en-GB" sz="11200" b="1" dirty="0"/>
+              <a:t>IN DEMO:  </a:t>
+            </a:r>
+            <a:r>
+              <a:rPr lang="en-GB" sz="8000" dirty="0"/>
+              <a:t>I will add…</a:t>
+            </a:r>
+          </a:p>
+          <a:p>
+            <a:pPr marL="0" indent="0">
+              <a:buNone/>
+            </a:pPr>
+            <a:r>
+              <a:rPr lang="en-GB" sz="8000" dirty="0"/>
+              <a:t>[“There is a folder already called `</a:t>
+            </a:r>
+            <a:r>
+              <a:rPr lang="en-GB" sz="8000" dirty="0" err="1"/>
+              <a:t>sales_etl_analysis</a:t>
+            </a:r>
+            <a:r>
+              <a:rPr lang="en-GB" sz="8000" dirty="0"/>
+              <a:t>` - please ignore and start afresh”]</a:t>
+            </a:r>
+          </a:p>
+        </p:txBody>
+      </p:sp>
+    </p:spTree>
+    <p:extLst>
+      <p:ext uri="{BB962C8B-B14F-4D97-AF65-F5344CB8AC3E}">
+        <p14:creationId xmlns:p14="http://schemas.microsoft.com/office/powerpoint/2010/main" val="3282389886"/>
+      </p:ext>
+    </p:extLst>
+  </p:cSld>
+  <p:clrMapOvr>
+    <a:masterClrMapping/>
+  </p:clrMapOvr>
+</p:sld>
+</file>
+
+<file path=ppt/slides/slide22.xml><?xml version="1.0" encoding="utf-8"?>
 <p:sld xmlns:a="http://schemas.openxmlformats.org/drawingml/2006/main" xmlns:r="http://schemas.openxmlformats.org/officeDocument/2006/relationships" xmlns:p="http://schemas.openxmlformats.org/presentationml/2006/main">
   <p:cSld>
     <p:bg>

</xml_diff>